<commit_message>
Finalized day 3 slides
</commit_message>
<xml_diff>
--- a/Class_Materials/Week_3/Day_1/ISBPM w3d1.pptx
+++ b/Class_Materials/Week_3/Day_1/ISBPM w3d1.pptx
@@ -5,20 +5,17 @@
     <p:sldMasterId id="2147483900" r:id="rId1"/>
   </p:sldMasterIdLst>
   <p:notesMasterIdLst>
-    <p:notesMasterId r:id="rId13"/>
+    <p:notesMasterId r:id="rId10"/>
   </p:notesMasterIdLst>
   <p:sldIdLst>
     <p:sldId id="256" r:id="rId2"/>
     <p:sldId id="298" r:id="rId3"/>
     <p:sldId id="278" r:id="rId4"/>
     <p:sldId id="326" r:id="rId5"/>
-    <p:sldId id="280" r:id="rId6"/>
-    <p:sldId id="277" r:id="rId7"/>
-    <p:sldId id="281" r:id="rId8"/>
-    <p:sldId id="275" r:id="rId9"/>
-    <p:sldId id="260" r:id="rId10"/>
-    <p:sldId id="276" r:id="rId11"/>
-    <p:sldId id="324" r:id="rId12"/>
+    <p:sldId id="275" r:id="rId6"/>
+    <p:sldId id="260" r:id="rId7"/>
+    <p:sldId id="276" r:id="rId8"/>
+    <p:sldId id="324" r:id="rId9"/>
   </p:sldIdLst>
   <p:sldSz cx="12192000" cy="6858000"/>
   <p:notesSz cx="6858000" cy="9144000"/>
@@ -3482,10 +3479,25 @@
   <pc:docChgLst>
     <pc:chgData name="Emily Crose" userId="5a1598ef78992c55" providerId="LiveId" clId="{67002AFB-16E7-4872-A597-832B63EBDEE2}"/>
     <pc:docChg chg="addSld delSld modSld">
-      <pc:chgData name="Emily Crose" userId="5a1598ef78992c55" providerId="LiveId" clId="{67002AFB-16E7-4872-A597-832B63EBDEE2}" dt="2023-04-18T18:00:46.301" v="1"/>
+      <pc:chgData name="Emily Crose" userId="5a1598ef78992c55" providerId="LiveId" clId="{67002AFB-16E7-4872-A597-832B63EBDEE2}" dt="2023-04-19T14:24:48.328" v="7" actId="20577"/>
       <pc:docMkLst>
         <pc:docMk/>
       </pc:docMkLst>
+      <pc:sldChg chg="modSp mod">
+        <pc:chgData name="Emily Crose" userId="5a1598ef78992c55" providerId="LiveId" clId="{67002AFB-16E7-4872-A597-832B63EBDEE2}" dt="2023-04-19T14:24:48.328" v="7" actId="20577"/>
+        <pc:sldMkLst>
+          <pc:docMk/>
+          <pc:sldMk cId="1938681844" sldId="256"/>
+        </pc:sldMkLst>
+        <pc:spChg chg="mod">
+          <ac:chgData name="Emily Crose" userId="5a1598ef78992c55" providerId="LiveId" clId="{67002AFB-16E7-4872-A597-832B63EBDEE2}" dt="2023-04-19T14:24:48.328" v="7" actId="20577"/>
+          <ac:spMkLst>
+            <pc:docMk/>
+            <pc:sldMk cId="1938681844" sldId="256"/>
+            <ac:spMk id="3" creationId="{AF3ACA5B-2163-AEC4-7BB9-C0423A72604D}"/>
+          </ac:spMkLst>
+        </pc:spChg>
+      </pc:sldChg>
       <pc:sldChg chg="del">
         <pc:chgData name="Emily Crose" userId="5a1598ef78992c55" providerId="LiveId" clId="{67002AFB-16E7-4872-A597-832B63EBDEE2}" dt="2023-04-18T18:00:42.188" v="0" actId="47"/>
         <pc:sldMkLst>
@@ -3549,8 +3561,8 @@
           <pc:sldMk cId="2670941506" sldId="272"/>
         </pc:sldMkLst>
       </pc:sldChg>
-      <pc:sldChg chg="add">
-        <pc:chgData name="Emily Crose" userId="5a1598ef78992c55" providerId="LiveId" clId="{67002AFB-16E7-4872-A597-832B63EBDEE2}" dt="2023-04-18T18:00:46.301" v="1"/>
+      <pc:sldChg chg="add del">
+        <pc:chgData name="Emily Crose" userId="5a1598ef78992c55" providerId="LiveId" clId="{67002AFB-16E7-4872-A597-832B63EBDEE2}" dt="2023-04-19T14:20:52.425" v="2" actId="2696"/>
         <pc:sldMkLst>
           <pc:docMk/>
           <pc:sldMk cId="2158119916" sldId="277"/>
@@ -3563,15 +3575,15 @@
           <pc:sldMk cId="2935181501" sldId="279"/>
         </pc:sldMkLst>
       </pc:sldChg>
-      <pc:sldChg chg="add">
-        <pc:chgData name="Emily Crose" userId="5a1598ef78992c55" providerId="LiveId" clId="{67002AFB-16E7-4872-A597-832B63EBDEE2}" dt="2023-04-18T18:00:46.301" v="1"/>
+      <pc:sldChg chg="add del">
+        <pc:chgData name="Emily Crose" userId="5a1598ef78992c55" providerId="LiveId" clId="{67002AFB-16E7-4872-A597-832B63EBDEE2}" dt="2023-04-19T14:20:52.425" v="2" actId="2696"/>
         <pc:sldMkLst>
           <pc:docMk/>
           <pc:sldMk cId="3076984293" sldId="280"/>
         </pc:sldMkLst>
       </pc:sldChg>
-      <pc:sldChg chg="add">
-        <pc:chgData name="Emily Crose" userId="5a1598ef78992c55" providerId="LiveId" clId="{67002AFB-16E7-4872-A597-832B63EBDEE2}" dt="2023-04-18T18:00:46.301" v="1"/>
+      <pc:sldChg chg="add del">
+        <pc:chgData name="Emily Crose" userId="5a1598ef78992c55" providerId="LiveId" clId="{67002AFB-16E7-4872-A597-832B63EBDEE2}" dt="2023-04-19T14:20:52.425" v="2" actId="2696"/>
         <pc:sldMkLst>
           <pc:docMk/>
           <pc:sldMk cId="3028504148" sldId="281"/>
@@ -3807,6 +3819,21 @@
           <pc:docMk/>
           <pc:sldMk cId="2233173004" sldId="325"/>
         </pc:sldMkLst>
+      </pc:sldChg>
+      <pc:sldChg chg="modSp mod">
+        <pc:chgData name="Emily Crose" userId="5a1598ef78992c55" providerId="LiveId" clId="{67002AFB-16E7-4872-A597-832B63EBDEE2}" dt="2023-04-19T14:21:02.606" v="3" actId="20577"/>
+        <pc:sldMkLst>
+          <pc:docMk/>
+          <pc:sldMk cId="3485029189" sldId="326"/>
+        </pc:sldMkLst>
+        <pc:spChg chg="mod">
+          <ac:chgData name="Emily Crose" userId="5a1598ef78992c55" providerId="LiveId" clId="{67002AFB-16E7-4872-A597-832B63EBDEE2}" dt="2023-04-19T14:21:02.606" v="3" actId="20577"/>
+          <ac:spMkLst>
+            <pc:docMk/>
+            <pc:sldMk cId="3485029189" sldId="326"/>
+            <ac:spMk id="5" creationId="{4257133E-120B-4836-B845-1320AD89F184}"/>
+          </ac:spMkLst>
+        </pc:spChg>
       </pc:sldChg>
       <pc:sldChg chg="del">
         <pc:chgData name="Emily Crose" userId="5a1598ef78992c55" providerId="LiveId" clId="{67002AFB-16E7-4872-A597-832B63EBDEE2}" dt="2023-04-18T18:00:42.188" v="0" actId="47"/>
@@ -7765,7 +7792,7 @@
           <a:p>
             <a:fld id="{BE048F1E-0B01-B04D-9371-15538F615E4A}" type="datetimeFigureOut">
               <a:rPr lang="en-US" smtClean="0"/>
-              <a:t>4/18/2023</a:t>
+              <a:t>4/19/2023</a:t>
             </a:fld>
             <a:endParaRPr lang="en-US"/>
           </a:p>
@@ -8116,180 +8143,6 @@
 </p:notes>
 </file>
 
-<file path=ppt/notesSlides/notesSlide2.xml><?xml version="1.0" encoding="utf-8"?>
-<p:notes xmlns:a="http://schemas.openxmlformats.org/drawingml/2006/main" xmlns:r="http://schemas.openxmlformats.org/officeDocument/2006/relationships" xmlns:p="http://schemas.openxmlformats.org/presentationml/2006/main">
-  <p:cSld>
-    <p:spTree>
-      <p:nvGrpSpPr>
-        <p:cNvPr id="1" name=""/>
-        <p:cNvGrpSpPr/>
-        <p:nvPr/>
-      </p:nvGrpSpPr>
-      <p:grpSpPr>
-        <a:xfrm>
-          <a:off x="0" y="0"/>
-          <a:ext cx="0" cy="0"/>
-          <a:chOff x="0" y="0"/>
-          <a:chExt cx="0" cy="0"/>
-        </a:xfrm>
-      </p:grpSpPr>
-      <p:sp>
-        <p:nvSpPr>
-          <p:cNvPr id="2" name="Slide Image Placeholder 1"/>
-          <p:cNvSpPr>
-            <a:spLocks noGrp="1" noRot="1" noChangeAspect="1"/>
-          </p:cNvSpPr>
-          <p:nvPr>
-            <p:ph type="sldImg"/>
-          </p:nvPr>
-        </p:nvSpPr>
-        <p:spPr/>
-      </p:sp>
-      <p:sp>
-        <p:nvSpPr>
-          <p:cNvPr id="3" name="Notes Placeholder 2"/>
-          <p:cNvSpPr>
-            <a:spLocks noGrp="1"/>
-          </p:cNvSpPr>
-          <p:nvPr>
-            <p:ph type="body" idx="1"/>
-          </p:nvPr>
-        </p:nvSpPr>
-        <p:spPr/>
-        <p:txBody>
-          <a:bodyPr/>
-          <a:lstStyle/>
-          <a:p>
-            <a:r>
-              <a:rPr lang="en-US" dirty="0"/>
-              <a:t>Over the last couple of days, we’ve talked a lot about the types of software we may interact with in our lives. We now have a sense of scale of how large of a project it is to build an app, so the question for us becomes; how do we approach this project with as much organization as possible? That’s where the software development life cycle comes into play</a:t>
-            </a:r>
-          </a:p>
-        </p:txBody>
-      </p:sp>
-      <p:sp>
-        <p:nvSpPr>
-          <p:cNvPr id="4" name="Slide Number Placeholder 3"/>
-          <p:cNvSpPr>
-            <a:spLocks noGrp="1"/>
-          </p:cNvSpPr>
-          <p:nvPr>
-            <p:ph type="sldNum" sz="quarter" idx="5"/>
-          </p:nvPr>
-        </p:nvSpPr>
-        <p:spPr/>
-        <p:txBody>
-          <a:bodyPr/>
-          <a:lstStyle/>
-          <a:p>
-            <a:fld id="{10D988CA-5978-2244-BA11-DC1A92DB7F45}" type="slidenum">
-              <a:rPr lang="en-US" smtClean="0"/>
-              <a:t>5</a:t>
-            </a:fld>
-            <a:endParaRPr lang="en-US"/>
-          </a:p>
-        </p:txBody>
-      </p:sp>
-    </p:spTree>
-    <p:extLst>
-      <p:ext uri="{BB962C8B-B14F-4D97-AF65-F5344CB8AC3E}">
-        <p14:creationId xmlns:p14="http://schemas.microsoft.com/office/powerpoint/2010/main" val="2000501755"/>
-      </p:ext>
-    </p:extLst>
-  </p:cSld>
-  <p:clrMapOvr>
-    <a:masterClrMapping/>
-  </p:clrMapOvr>
-</p:notes>
-</file>
-
-<file path=ppt/notesSlides/notesSlide3.xml><?xml version="1.0" encoding="utf-8"?>
-<p:notes xmlns:a="http://schemas.openxmlformats.org/drawingml/2006/main" xmlns:r="http://schemas.openxmlformats.org/officeDocument/2006/relationships" xmlns:p="http://schemas.openxmlformats.org/presentationml/2006/main">
-  <p:cSld>
-    <p:spTree>
-      <p:nvGrpSpPr>
-        <p:cNvPr id="1" name=""/>
-        <p:cNvGrpSpPr/>
-        <p:nvPr/>
-      </p:nvGrpSpPr>
-      <p:grpSpPr>
-        <a:xfrm>
-          <a:off x="0" y="0"/>
-          <a:ext cx="0" cy="0"/>
-          <a:chOff x="0" y="0"/>
-          <a:chExt cx="0" cy="0"/>
-        </a:xfrm>
-      </p:grpSpPr>
-      <p:sp>
-        <p:nvSpPr>
-          <p:cNvPr id="2" name="Slide Image Placeholder 1"/>
-          <p:cNvSpPr>
-            <a:spLocks noGrp="1" noRot="1" noChangeAspect="1"/>
-          </p:cNvSpPr>
-          <p:nvPr>
-            <p:ph type="sldImg"/>
-          </p:nvPr>
-        </p:nvSpPr>
-        <p:spPr/>
-      </p:sp>
-      <p:sp>
-        <p:nvSpPr>
-          <p:cNvPr id="3" name="Notes Placeholder 2"/>
-          <p:cNvSpPr>
-            <a:spLocks noGrp="1"/>
-          </p:cNvSpPr>
-          <p:nvPr>
-            <p:ph type="body" idx="1"/>
-          </p:nvPr>
-        </p:nvSpPr>
-        <p:spPr/>
-        <p:txBody>
-          <a:bodyPr/>
-          <a:lstStyle/>
-          <a:p>
-            <a:r>
-              <a:rPr lang="en-US" dirty="0"/>
-              <a:t>This is a simple example of the SDLC. Typically, representations of the SDLC will have around 6 steps, but the steps will generally match what you see here. </a:t>
-            </a:r>
-          </a:p>
-        </p:txBody>
-      </p:sp>
-      <p:sp>
-        <p:nvSpPr>
-          <p:cNvPr id="4" name="Slide Number Placeholder 3"/>
-          <p:cNvSpPr>
-            <a:spLocks noGrp="1"/>
-          </p:cNvSpPr>
-          <p:nvPr>
-            <p:ph type="sldNum" sz="quarter" idx="5"/>
-          </p:nvPr>
-        </p:nvSpPr>
-        <p:spPr/>
-        <p:txBody>
-          <a:bodyPr/>
-          <a:lstStyle/>
-          <a:p>
-            <a:fld id="{10D988CA-5978-2244-BA11-DC1A92DB7F45}" type="slidenum">
-              <a:rPr lang="en-US" smtClean="0"/>
-              <a:t>7</a:t>
-            </a:fld>
-            <a:endParaRPr lang="en-US"/>
-          </a:p>
-        </p:txBody>
-      </p:sp>
-    </p:spTree>
-    <p:extLst>
-      <p:ext uri="{BB962C8B-B14F-4D97-AF65-F5344CB8AC3E}">
-        <p14:creationId xmlns:p14="http://schemas.microsoft.com/office/powerpoint/2010/main" val="2071879139"/>
-      </p:ext>
-    </p:extLst>
-  </p:cSld>
-  <p:clrMapOvr>
-    <a:masterClrMapping/>
-  </p:clrMapOvr>
-</p:notes>
-</file>
-
 <file path=ppt/slideLayouts/slideLayout1.xml><?xml version="1.0" encoding="utf-8"?>
 <p:sldLayout xmlns:a="http://schemas.openxmlformats.org/drawingml/2006/main" xmlns:r="http://schemas.openxmlformats.org/officeDocument/2006/relationships" xmlns:p="http://schemas.openxmlformats.org/presentationml/2006/main" type="title" preserve="1">
   <p:cSld name="Title Slide">
@@ -8519,7 +8372,7 @@
           <a:p>
             <a:fld id="{1160EA64-D806-43AC-9DF2-F8C432F32B4C}" type="datetimeFigureOut">
               <a:rPr lang="en-US" smtClean="0"/>
-              <a:t>4/18/2023</a:t>
+              <a:t>4/19/2023</a:t>
             </a:fld>
             <a:endParaRPr lang="en-US" dirty="0"/>
           </a:p>
@@ -8854,7 +8707,7 @@
           <a:p>
             <a:fld id="{1160EA64-D806-43AC-9DF2-F8C432F32B4C}" type="datetimeFigureOut">
               <a:rPr lang="en-US" smtClean="0"/>
-              <a:t>4/18/2023</a:t>
+              <a:t>4/19/2023</a:t>
             </a:fld>
             <a:endParaRPr lang="en-US" dirty="0"/>
           </a:p>
@@ -9134,7 +8987,7 @@
           <a:p>
             <a:fld id="{1160EA64-D806-43AC-9DF2-F8C432F32B4C}" type="datetimeFigureOut">
               <a:rPr lang="en-US" smtClean="0"/>
-              <a:t>4/18/2023</a:t>
+              <a:t>4/19/2023</a:t>
             </a:fld>
             <a:endParaRPr lang="en-US" dirty="0"/>
           </a:p>
@@ -9704,7 +9557,7 @@
           <a:p>
             <a:fld id="{1160EA64-D806-43AC-9DF2-F8C432F32B4C}" type="datetimeFigureOut">
               <a:rPr lang="en-US" smtClean="0"/>
-              <a:t>4/18/2023</a:t>
+              <a:t>4/19/2023</a:t>
             </a:fld>
             <a:endParaRPr lang="en-US" dirty="0"/>
           </a:p>
@@ -9984,7 +9837,7 @@
           <a:p>
             <a:fld id="{1160EA64-D806-43AC-9DF2-F8C432F32B4C}" type="datetimeFigureOut">
               <a:rPr lang="en-US" smtClean="0"/>
-              <a:t>4/18/2023</a:t>
+              <a:t>4/19/2023</a:t>
             </a:fld>
             <a:endParaRPr lang="en-US" dirty="0"/>
           </a:p>
@@ -10548,7 +10401,7 @@
           <a:p>
             <a:fld id="{1160EA64-D806-43AC-9DF2-F8C432F32B4C}" type="datetimeFigureOut">
               <a:rPr lang="en-US" smtClean="0"/>
-              <a:t>4/18/2023</a:t>
+              <a:t>4/19/2023</a:t>
             </a:fld>
             <a:endParaRPr lang="en-US" dirty="0"/>
           </a:p>
@@ -10877,7 +10730,7 @@
           <a:p>
             <a:fld id="{1160EA64-D806-43AC-9DF2-F8C432F32B4C}" type="datetimeFigureOut">
               <a:rPr lang="en-US" smtClean="0"/>
-              <a:t>4/18/2023</a:t>
+              <a:t>4/19/2023</a:t>
             </a:fld>
             <a:endParaRPr lang="en-US" dirty="0"/>
           </a:p>
@@ -11056,7 +10909,7 @@
           <a:p>
             <a:fld id="{E9F9C37B-1D36-470B-8223-D6C91242EC14}" type="datetimeFigureOut">
               <a:rPr lang="en-US" smtClean="0"/>
-              <a:t>4/18/2023</a:t>
+              <a:t>4/19/2023</a:t>
             </a:fld>
             <a:endParaRPr lang="en-US" dirty="0"/>
           </a:p>
@@ -11294,7 +11147,7 @@
           <a:p>
             <a:fld id="{67C6F52A-A82B-47A2-A83A-8C4C91F2D59F}" type="datetimeFigureOut">
               <a:rPr lang="en-US" smtClean="0"/>
-              <a:t>4/18/2023</a:t>
+              <a:t>4/19/2023</a:t>
             </a:fld>
             <a:endParaRPr lang="en-US" dirty="0"/>
           </a:p>
@@ -11494,7 +11347,7 @@
           <a:p>
             <a:fld id="{F070A7B3-6521-4DCA-87E5-044747A908C1}" type="datetimeFigureOut">
               <a:rPr lang="en-US" smtClean="0"/>
-              <a:t>4/18/2023</a:t>
+              <a:t>4/19/2023</a:t>
             </a:fld>
             <a:endParaRPr lang="en-US" dirty="0"/>
           </a:p>
@@ -11771,7 +11624,7 @@
           <a:p>
             <a:fld id="{1160EA64-D806-43AC-9DF2-F8C432F32B4C}" type="datetimeFigureOut">
               <a:rPr lang="en-US" smtClean="0"/>
-              <a:t>4/18/2023</a:t>
+              <a:t>4/19/2023</a:t>
             </a:fld>
             <a:endParaRPr lang="en-US" dirty="0"/>
           </a:p>
@@ -12038,7 +11891,7 @@
           <a:p>
             <a:fld id="{AB134690-1557-4C89-A502-4959FE7FAD70}" type="datetimeFigureOut">
               <a:rPr lang="en-US" smtClean="0"/>
-              <a:t>4/18/2023</a:t>
+              <a:t>4/19/2023</a:t>
             </a:fld>
             <a:endParaRPr lang="en-US" dirty="0"/>
           </a:p>
@@ -12412,7 +12265,7 @@
           <a:p>
             <a:fld id="{1160EA64-D806-43AC-9DF2-F8C432F32B4C}" type="datetimeFigureOut">
               <a:rPr lang="en-US" smtClean="0"/>
-              <a:t>4/18/2023</a:t>
+              <a:t>4/19/2023</a:t>
             </a:fld>
             <a:endParaRPr lang="en-US" dirty="0"/>
           </a:p>
@@ -12562,7 +12415,7 @@
           <a:p>
             <a:fld id="{E1037C31-9E7A-4F99-8774-A0E530DE1A42}" type="datetimeFigureOut">
               <a:rPr lang="en-US" smtClean="0"/>
-              <a:t>4/18/2023</a:t>
+              <a:t>4/19/2023</a:t>
             </a:fld>
             <a:endParaRPr lang="en-US" dirty="0"/>
           </a:p>
@@ -12687,7 +12540,7 @@
           <a:p>
             <a:fld id="{C278504F-A551-4DE0-9316-4DCD1D8CC752}" type="datetimeFigureOut">
               <a:rPr lang="en-US" smtClean="0"/>
-              <a:t>4/18/2023</a:t>
+              <a:t>4/19/2023</a:t>
             </a:fld>
             <a:endParaRPr lang="en-US" dirty="0"/>
           </a:p>
@@ -12972,7 +12825,7 @@
           <a:p>
             <a:fld id="{D1BE4249-C0D0-4B06-8692-E8BB871AF643}" type="datetimeFigureOut">
               <a:rPr lang="en-US" smtClean="0"/>
-              <a:t>4/18/2023</a:t>
+              <a:t>4/19/2023</a:t>
             </a:fld>
             <a:endParaRPr lang="en-US" dirty="0"/>
           </a:p>
@@ -13296,7 +13149,7 @@
           <a:p>
             <a:fld id="{042B0DB6-F5C7-45FB-8CF3-31B45F9C2DAC}" type="datetimeFigureOut">
               <a:rPr lang="en-US" smtClean="0"/>
-              <a:t>4/18/2023</a:t>
+              <a:t>4/19/2023</a:t>
             </a:fld>
             <a:endParaRPr lang="en-US" dirty="0"/>
           </a:p>
@@ -13510,7 +13363,7 @@
           <a:p>
             <a:fld id="{1160EA64-D806-43AC-9DF2-F8C432F32B4C}" type="datetimeFigureOut">
               <a:rPr lang="en-US" smtClean="0"/>
-              <a:t>4/18/2023</a:t>
+              <a:t>4/19/2023</a:t>
             </a:fld>
             <a:endParaRPr lang="en-US" dirty="0"/>
           </a:p>
@@ -14782,7 +14635,7 @@
           <a:p>
             <a:pPr algn="ctr"/>
             <a:r>
-              <a:rPr lang="en-US" b="1" cap="none" dirty="0">
+              <a:rPr lang="en-US" b="1" cap="none">
                 <a:solidFill>
                   <a:schemeClr val="tx1">
                     <a:lumMod val="85000"/>
@@ -14790,8 +14643,16 @@
                   </a:schemeClr>
                 </a:solidFill>
               </a:rPr>
-              <a:t>Week 2 Day 2</a:t>
+              <a:t>Week 3 Day 1</a:t>
             </a:r>
+            <a:endParaRPr lang="en-US" b="1" cap="none" dirty="0">
+              <a:solidFill>
+                <a:schemeClr val="tx1">
+                  <a:lumMod val="85000"/>
+                  <a:lumOff val="15000"/>
+                </a:schemeClr>
+              </a:solidFill>
+            </a:endParaRPr>
           </a:p>
           <a:p>
             <a:pPr algn="ctr"/>
@@ -14846,352 +14707,6 @@
   </p:cSld>
   <p:clrMapOvr>
     <a:overrideClrMapping bg1="lt1" tx1="dk1" bg2="lt2" tx2="dk2" accent1="accent1" accent2="accent2" accent3="accent3" accent4="accent4" accent5="accent5" accent6="accent6" hlink="hlink" folHlink="folHlink"/>
-  </p:clrMapOvr>
-</p:sld>
-</file>
-
-<file path=ppt/slides/slide10.xml><?xml version="1.0" encoding="utf-8"?>
-<p:sld xmlns:a="http://schemas.openxmlformats.org/drawingml/2006/main" xmlns:r="http://schemas.openxmlformats.org/officeDocument/2006/relationships" xmlns:p="http://schemas.openxmlformats.org/presentationml/2006/main">
-  <p:cSld>
-    <p:bg>
-      <p:bgPr>
-        <a:solidFill>
-          <a:schemeClr val="bg1">
-            <a:lumMod val="95000"/>
-          </a:schemeClr>
-        </a:solidFill>
-        <a:effectLst/>
-      </p:bgPr>
-    </p:bg>
-    <p:spTree>
-      <p:nvGrpSpPr>
-        <p:cNvPr id="1" name=""/>
-        <p:cNvGrpSpPr/>
-        <p:nvPr/>
-      </p:nvGrpSpPr>
-      <p:grpSpPr>
-        <a:xfrm>
-          <a:off x="0" y="0"/>
-          <a:ext cx="0" cy="0"/>
-          <a:chOff x="0" y="0"/>
-          <a:chExt cx="0" cy="0"/>
-        </a:xfrm>
-      </p:grpSpPr>
-      <p:pic>
-        <p:nvPicPr>
-          <p:cNvPr id="6" name="Picture 3" descr="Background pattern&#10;&#10;Description automatically generated">
-            <a:extLst>
-              <a:ext uri="{FF2B5EF4-FFF2-40B4-BE49-F238E27FC236}">
-                <a16:creationId xmlns:a16="http://schemas.microsoft.com/office/drawing/2014/main" id="{D32171E9-270F-BA0C-17D9-9525FB89BC77}"/>
-              </a:ext>
-            </a:extLst>
-          </p:cNvPr>
-          <p:cNvPicPr>
-            <a:picLocks noChangeAspect="1"/>
-          </p:cNvPicPr>
-          <p:nvPr/>
-        </p:nvPicPr>
-        <p:blipFill rotWithShape="1">
-          <a:blip r:embed="rId2"/>
-          <a:srcRect t="3334" b="12397"/>
-          <a:stretch/>
-        </p:blipFill>
-        <p:spPr>
-          <a:xfrm>
-            <a:off x="20" y="10"/>
-            <a:ext cx="12191980" cy="6857990"/>
-          </a:xfrm>
-          <a:prstGeom prst="rect">
-            <a:avLst/>
-          </a:prstGeom>
-        </p:spPr>
-      </p:pic>
-      <p:sp>
-        <p:nvSpPr>
-          <p:cNvPr id="2" name="Title 1">
-            <a:extLst>
-              <a:ext uri="{FF2B5EF4-FFF2-40B4-BE49-F238E27FC236}">
-                <a16:creationId xmlns:a16="http://schemas.microsoft.com/office/drawing/2014/main" id="{B963730F-E840-E5E0-87C0-65F532F962AC}"/>
-              </a:ext>
-            </a:extLst>
-          </p:cNvPr>
-          <p:cNvSpPr>
-            <a:spLocks noGrp="1"/>
-          </p:cNvSpPr>
-          <p:nvPr>
-            <p:ph type="title"/>
-          </p:nvPr>
-        </p:nvSpPr>
-        <p:spPr>
-          <a:xfrm>
-            <a:off x="1601724" y="2606040"/>
-            <a:ext cx="8988552" cy="1645920"/>
-          </a:xfrm>
-          <a:solidFill>
-            <a:srgbClr val="000000">
-              <a:alpha val="70000"/>
-            </a:srgbClr>
-          </a:solidFill>
-          <a:ln>
-            <a:solidFill>
-              <a:srgbClr val="FFFFFF"/>
-            </a:solidFill>
-          </a:ln>
-        </p:spPr>
-        <p:txBody>
-          <a:bodyPr>
-            <a:normAutofit/>
-          </a:bodyPr>
-          <a:lstStyle/>
-          <a:p>
-            <a:r>
-              <a:rPr lang="en-US" sz="3800">
-                <a:solidFill>
-                  <a:srgbClr val="FFFFFF"/>
-                </a:solidFill>
-              </a:rPr>
-              <a:t>Preview day 3</a:t>
-            </a:r>
-          </a:p>
-        </p:txBody>
-      </p:sp>
-    </p:spTree>
-    <p:extLst>
-      <p:ext uri="{BB962C8B-B14F-4D97-AF65-F5344CB8AC3E}">
-        <p14:creationId xmlns:p14="http://schemas.microsoft.com/office/powerpoint/2010/main" val="3104054636"/>
-      </p:ext>
-    </p:extLst>
-  </p:cSld>
-  <p:clrMapOvr>
-    <a:masterClrMapping/>
-  </p:clrMapOvr>
-</p:sld>
-</file>
-
-<file path=ppt/slides/slide11.xml><?xml version="1.0" encoding="utf-8"?>
-<p:sld xmlns:a="http://schemas.openxmlformats.org/drawingml/2006/main" xmlns:r="http://schemas.openxmlformats.org/officeDocument/2006/relationships" xmlns:p="http://schemas.openxmlformats.org/presentationml/2006/main">
-  <p:cSld>
-    <p:bg>
-      <p:bgPr>
-        <a:blipFill>
-          <a:blip r:embed="rId2"/>
-          <a:stretch/>
-        </a:blipFill>
-        <a:effectLst/>
-      </p:bgPr>
-    </p:bg>
-    <p:spTree>
-      <p:nvGrpSpPr>
-        <p:cNvPr id="1" name=""/>
-        <p:cNvGrpSpPr/>
-        <p:nvPr/>
-      </p:nvGrpSpPr>
-      <p:grpSpPr>
-        <a:xfrm>
-          <a:off x="0" y="0"/>
-          <a:ext cx="0" cy="0"/>
-          <a:chOff x="0" y="0"/>
-          <a:chExt cx="0" cy="0"/>
-        </a:xfrm>
-      </p:grpSpPr>
-      <p:pic>
-        <p:nvPicPr>
-          <p:cNvPr id="23" name="Picture 6">
-            <a:extLst>
-              <a:ext uri="{FF2B5EF4-FFF2-40B4-BE49-F238E27FC236}">
-                <a16:creationId xmlns:a16="http://schemas.microsoft.com/office/drawing/2014/main" id="{18BD78ED-75E1-4879-B369-BC61F7C45E22}"/>
-              </a:ext>
-              <a:ext uri="{C183D7F6-B498-43B3-948B-1728B52AA6E4}">
-                <adec:decorative xmlns:adec="http://schemas.microsoft.com/office/drawing/2017/decorative" val="1"/>
-              </a:ext>
-            </a:extLst>
-          </p:cNvPr>
-          <p:cNvPicPr>
-            <a:picLocks noGrp="1" noRot="1" noChangeAspect="1" noMove="1" noResize="1" noEditPoints="1" noAdjustHandles="1" noChangeArrowheads="1" noChangeShapeType="1" noCrop="1"/>
-          </p:cNvPicPr>
-          <p:nvPr>
-            <p:extLst>
-              <p:ext uri="{386F3935-93C4-4BCD-93E2-E3B085C9AB24}">
-                <p16:designElem xmlns:p16="http://schemas.microsoft.com/office/powerpoint/2015/main" val="1"/>
-              </p:ext>
-            </p:extLst>
-          </p:nvPr>
-        </p:nvPicPr>
-        <p:blipFill>
-          <a:blip r:embed="rId3">
-            <a:extLst>
-              <a:ext uri="{28A0092B-C50C-407E-A947-70E740481C1C}">
-                <a14:useLocalDpi xmlns:a14="http://schemas.microsoft.com/office/drawing/2010/main" val="0"/>
-              </a:ext>
-            </a:extLst>
-          </a:blip>
-          <a:stretch>
-            <a:fillRect/>
-          </a:stretch>
-        </p:blipFill>
-        <p:spPr>
-          <a:xfrm>
-            <a:off x="0" y="0"/>
-            <a:ext cx="12188825" cy="6856214"/>
-          </a:xfrm>
-          <a:prstGeom prst="rect">
-            <a:avLst/>
-          </a:prstGeom>
-        </p:spPr>
-      </p:pic>
-      <p:sp useBgFill="1">
-        <p:nvSpPr>
-          <p:cNvPr id="24" name="Rectangle 8">
-            <a:extLst>
-              <a:ext uri="{FF2B5EF4-FFF2-40B4-BE49-F238E27FC236}">
-                <a16:creationId xmlns:a16="http://schemas.microsoft.com/office/drawing/2014/main" id="{3D1E5586-8BB5-40F6-96C3-2E87DD7CE5CD}"/>
-              </a:ext>
-              <a:ext uri="{C183D7F6-B498-43B3-948B-1728B52AA6E4}">
-                <adec:decorative xmlns:adec="http://schemas.microsoft.com/office/drawing/2017/decorative" val="1"/>
-              </a:ext>
-            </a:extLst>
-          </p:cNvPr>
-          <p:cNvSpPr>
-            <a:spLocks noGrp="1" noRot="1" noChangeAspect="1" noMove="1" noResize="1" noEditPoints="1" noAdjustHandles="1" noChangeArrowheads="1" noChangeShapeType="1" noTextEdit="1"/>
-          </p:cNvSpPr>
-          <p:nvPr>
-            <p:extLst>
-              <p:ext uri="{386F3935-93C4-4BCD-93E2-E3B085C9AB24}">
-                <p16:designElem xmlns:p16="http://schemas.microsoft.com/office/powerpoint/2015/main" val="1"/>
-              </p:ext>
-            </p:extLst>
-          </p:nvPr>
-        </p:nvSpPr>
-        <p:spPr>
-          <a:xfrm>
-            <a:off x="0" y="0"/>
-            <a:ext cx="12192000" cy="6858000"/>
-          </a:xfrm>
-          <a:prstGeom prst="rect">
-            <a:avLst/>
-          </a:prstGeom>
-          <a:ln>
-            <a:noFill/>
-          </a:ln>
-        </p:spPr>
-        <p:style>
-          <a:lnRef idx="2">
-            <a:schemeClr val="accent1">
-              <a:shade val="50000"/>
-            </a:schemeClr>
-          </a:lnRef>
-          <a:fillRef idx="1">
-            <a:schemeClr val="accent1"/>
-          </a:fillRef>
-          <a:effectRef idx="0">
-            <a:schemeClr val="accent1"/>
-          </a:effectRef>
-          <a:fontRef idx="minor">
-            <a:schemeClr val="lt1"/>
-          </a:fontRef>
-        </p:style>
-        <p:txBody>
-          <a:bodyPr rtlCol="0" anchor="ctr"/>
-          <a:lstStyle/>
-          <a:p>
-            <a:pPr algn="ctr"/>
-            <a:endParaRPr lang="en-US"/>
-          </a:p>
-        </p:txBody>
-      </p:sp>
-      <p:sp>
-        <p:nvSpPr>
-          <p:cNvPr id="2" name="Title 1">
-            <a:extLst>
-              <a:ext uri="{FF2B5EF4-FFF2-40B4-BE49-F238E27FC236}">
-                <a16:creationId xmlns:a16="http://schemas.microsoft.com/office/drawing/2014/main" id="{7C70C265-2288-E1A8-09A1-9D59E121A171}"/>
-              </a:ext>
-            </a:extLst>
-          </p:cNvPr>
-          <p:cNvSpPr>
-            <a:spLocks noGrp="1"/>
-          </p:cNvSpPr>
-          <p:nvPr>
-            <p:ph type="title"/>
-          </p:nvPr>
-        </p:nvSpPr>
-        <p:spPr>
-          <a:xfrm>
-            <a:off x="1993805" y="1354668"/>
-            <a:ext cx="8204391" cy="2346475"/>
-          </a:xfrm>
-        </p:spPr>
-        <p:txBody>
-          <a:bodyPr vert="horz" lIns="91440" tIns="45720" rIns="91440" bIns="45720" rtlCol="0" anchor="b">
-            <a:normAutofit/>
-          </a:bodyPr>
-          <a:lstStyle/>
-          <a:p>
-            <a:pPr algn="ctr"/>
-            <a:r>
-              <a:rPr lang="en-US" sz="6000"/>
-              <a:t>See you next time!</a:t>
-            </a:r>
-          </a:p>
-        </p:txBody>
-      </p:sp>
-      <p:cxnSp>
-        <p:nvCxnSpPr>
-          <p:cNvPr id="25" name="Straight Connector 10">
-            <a:extLst>
-              <a:ext uri="{FF2B5EF4-FFF2-40B4-BE49-F238E27FC236}">
-                <a16:creationId xmlns:a16="http://schemas.microsoft.com/office/drawing/2014/main" id="{8A832D40-B9E2-4CE7-9E0A-B35591EA2035}"/>
-              </a:ext>
-              <a:ext uri="{C183D7F6-B498-43B3-948B-1728B52AA6E4}">
-                <adec:decorative xmlns:adec="http://schemas.microsoft.com/office/drawing/2017/decorative" val="1"/>
-              </a:ext>
-            </a:extLst>
-          </p:cNvPr>
-          <p:cNvCxnSpPr>
-            <a:cxnSpLocks noGrp="1" noRot="1" noChangeAspect="1" noMove="1" noResize="1" noEditPoints="1" noAdjustHandles="1" noChangeArrowheads="1" noChangeShapeType="1"/>
-          </p:cNvCxnSpPr>
-          <p:nvPr>
-            <p:extLst>
-              <p:ext uri="{386F3935-93C4-4BCD-93E2-E3B085C9AB24}">
-                <p16:designElem xmlns:p16="http://schemas.microsoft.com/office/powerpoint/2015/main" val="1"/>
-              </p:ext>
-            </p:extLst>
-          </p:nvPr>
-        </p:nvCxnSpPr>
-        <p:spPr>
-          <a:xfrm>
-            <a:off x="5845629" y="3810000"/>
-            <a:ext cx="500743" cy="0"/>
-          </a:xfrm>
-          <a:prstGeom prst="line">
-            <a:avLst/>
-          </a:prstGeom>
-          <a:ln w="19050"/>
-        </p:spPr>
-        <p:style>
-          <a:lnRef idx="1">
-            <a:schemeClr val="accent1"/>
-          </a:lnRef>
-          <a:fillRef idx="0">
-            <a:schemeClr val="accent1"/>
-          </a:fillRef>
-          <a:effectRef idx="0">
-            <a:schemeClr val="accent1"/>
-          </a:effectRef>
-          <a:fontRef idx="minor">
-            <a:schemeClr val="tx1"/>
-          </a:fontRef>
-        </p:style>
-      </p:cxnSp>
-    </p:spTree>
-    <p:extLst>
-      <p:ext uri="{BB962C8B-B14F-4D97-AF65-F5344CB8AC3E}">
-        <p14:creationId xmlns:p14="http://schemas.microsoft.com/office/powerpoint/2010/main" val="3451560091"/>
-      </p:ext>
-    </p:extLst>
-  </p:cSld>
-  <p:clrMapOvr>
-    <a:masterClrMapping/>
   </p:clrMapOvr>
 </p:sld>
 </file>
@@ -20024,45 +19539,6 @@
           <a:bodyPr/>
           <a:lstStyle/>
           <a:p>
-            <a:r>
-              <a:rPr lang="en-US" dirty="0"/>
-              <a:t>Cache</a:t>
-            </a:r>
-          </a:p>
-          <a:p>
-            <a:pPr lvl="1"/>
-            <a:r>
-              <a:rPr lang="en-US" dirty="0"/>
-              <a:t>A small portion of RAM set aside for temporary storage for frequently accessed data</a:t>
-            </a:r>
-          </a:p>
-          <a:p>
-            <a:r>
-              <a:rPr lang="en-US" dirty="0"/>
-              <a:t>Process Register</a:t>
-            </a:r>
-          </a:p>
-          <a:p>
-            <a:pPr lvl="1"/>
-            <a:r>
-              <a:rPr lang="en-US" dirty="0"/>
-              <a:t>A quickly accessible location available to a computer processor</a:t>
-            </a:r>
-          </a:p>
-          <a:p>
-            <a:r>
-              <a:rPr lang="en-US" dirty="0"/>
-              <a:t>Heap &amp; Stack</a:t>
-            </a:r>
-          </a:p>
-          <a:p>
-            <a:pPr lvl="1"/>
-            <a:r>
-              <a:rPr lang="en-US" dirty="0"/>
-              <a:t>Memory management methods </a:t>
-            </a:r>
-          </a:p>
-          <a:p>
             <a:pPr lvl="1"/>
             <a:endParaRPr lang="en-US" dirty="0"/>
           </a:p>
@@ -20082,250 +19558,6 @@
 </file>
 
 <file path=ppt/slides/slide5.xml><?xml version="1.0" encoding="utf-8"?>
-<p:sld xmlns:a="http://schemas.openxmlformats.org/drawingml/2006/main" xmlns:r="http://schemas.openxmlformats.org/officeDocument/2006/relationships" xmlns:p="http://schemas.openxmlformats.org/presentationml/2006/main">
-  <p:cSld>
-    <p:spTree>
-      <p:nvGrpSpPr>
-        <p:cNvPr id="1" name=""/>
-        <p:cNvGrpSpPr/>
-        <p:nvPr/>
-      </p:nvGrpSpPr>
-      <p:grpSpPr>
-        <a:xfrm>
-          <a:off x="0" y="0"/>
-          <a:ext cx="0" cy="0"/>
-          <a:chOff x="0" y="0"/>
-          <a:chExt cx="0" cy="0"/>
-        </a:xfrm>
-      </p:grpSpPr>
-      <p:sp>
-        <p:nvSpPr>
-          <p:cNvPr id="2" name="Title 1">
-            <a:extLst>
-              <a:ext uri="{FF2B5EF4-FFF2-40B4-BE49-F238E27FC236}">
-                <a16:creationId xmlns:a16="http://schemas.microsoft.com/office/drawing/2014/main" id="{2FD098B1-0412-424E-49DE-3F80E7AA8349}"/>
-              </a:ext>
-            </a:extLst>
-          </p:cNvPr>
-          <p:cNvSpPr>
-            <a:spLocks noGrp="1"/>
-          </p:cNvSpPr>
-          <p:nvPr>
-            <p:ph type="title"/>
-          </p:nvPr>
-        </p:nvSpPr>
-        <p:spPr/>
-        <p:txBody>
-          <a:bodyPr>
-            <a:normAutofit/>
-          </a:bodyPr>
-          <a:lstStyle/>
-          <a:p>
-            <a:r>
-              <a:rPr lang="en-US" dirty="0"/>
-              <a:t>The Software Development Life Cycle</a:t>
-            </a:r>
-          </a:p>
-        </p:txBody>
-      </p:sp>
-      <p:sp>
-        <p:nvSpPr>
-          <p:cNvPr id="3" name="Text Placeholder 2">
-            <a:extLst>
-              <a:ext uri="{FF2B5EF4-FFF2-40B4-BE49-F238E27FC236}">
-                <a16:creationId xmlns:a16="http://schemas.microsoft.com/office/drawing/2014/main" id="{9E791FFB-9F3B-75BA-D539-11E5BAB941EF}"/>
-              </a:ext>
-            </a:extLst>
-          </p:cNvPr>
-          <p:cNvSpPr>
-            <a:spLocks noGrp="1"/>
-          </p:cNvSpPr>
-          <p:nvPr>
-            <p:ph type="body" idx="1"/>
-          </p:nvPr>
-        </p:nvSpPr>
-        <p:spPr/>
-        <p:txBody>
-          <a:bodyPr/>
-          <a:lstStyle/>
-          <a:p>
-            <a:endParaRPr lang="en-US"/>
-          </a:p>
-        </p:txBody>
-      </p:sp>
-    </p:spTree>
-    <p:extLst>
-      <p:ext uri="{BB962C8B-B14F-4D97-AF65-F5344CB8AC3E}">
-        <p14:creationId xmlns:p14="http://schemas.microsoft.com/office/powerpoint/2010/main" val="3076984293"/>
-      </p:ext>
-    </p:extLst>
-  </p:cSld>
-  <p:clrMapOvr>
-    <a:masterClrMapping/>
-  </p:clrMapOvr>
-</p:sld>
-</file>
-
-<file path=ppt/slides/slide6.xml><?xml version="1.0" encoding="utf-8"?>
-<p:sld xmlns:a="http://schemas.openxmlformats.org/drawingml/2006/main" xmlns:r="http://schemas.openxmlformats.org/officeDocument/2006/relationships" xmlns:p="http://schemas.openxmlformats.org/presentationml/2006/main">
-  <p:cSld>
-    <p:spTree>
-      <p:nvGrpSpPr>
-        <p:cNvPr id="1" name=""/>
-        <p:cNvGrpSpPr/>
-        <p:nvPr/>
-      </p:nvGrpSpPr>
-      <p:grpSpPr>
-        <a:xfrm>
-          <a:off x="0" y="0"/>
-          <a:ext cx="0" cy="0"/>
-          <a:chOff x="0" y="0"/>
-          <a:chExt cx="0" cy="0"/>
-        </a:xfrm>
-      </p:grpSpPr>
-      <p:sp>
-        <p:nvSpPr>
-          <p:cNvPr id="2" name="Title 1">
-            <a:extLst>
-              <a:ext uri="{FF2B5EF4-FFF2-40B4-BE49-F238E27FC236}">
-                <a16:creationId xmlns:a16="http://schemas.microsoft.com/office/drawing/2014/main" id="{047B3247-CD57-A68D-86CB-226AD9D932CC}"/>
-              </a:ext>
-            </a:extLst>
-          </p:cNvPr>
-          <p:cNvSpPr>
-            <a:spLocks noGrp="1"/>
-          </p:cNvSpPr>
-          <p:nvPr>
-            <p:ph type="title"/>
-          </p:nvPr>
-        </p:nvSpPr>
-        <p:spPr/>
-        <p:txBody>
-          <a:bodyPr>
-            <a:normAutofit/>
-          </a:bodyPr>
-          <a:lstStyle/>
-          <a:p>
-            <a:r>
-              <a:rPr lang="en-US" dirty="0"/>
-              <a:t>What is the Software Development Life Cycle?</a:t>
-            </a:r>
-          </a:p>
-        </p:txBody>
-      </p:sp>
-      <p:sp>
-        <p:nvSpPr>
-          <p:cNvPr id="3" name="Content Placeholder 2">
-            <a:extLst>
-              <a:ext uri="{FF2B5EF4-FFF2-40B4-BE49-F238E27FC236}">
-                <a16:creationId xmlns:a16="http://schemas.microsoft.com/office/drawing/2014/main" id="{940F9860-AD79-8C22-AF4B-170D69ACC5C7}"/>
-              </a:ext>
-            </a:extLst>
-          </p:cNvPr>
-          <p:cNvSpPr>
-            <a:spLocks noGrp="1"/>
-          </p:cNvSpPr>
-          <p:nvPr>
-            <p:ph idx="1"/>
-          </p:nvPr>
-        </p:nvSpPr>
-        <p:spPr/>
-        <p:txBody>
-          <a:bodyPr/>
-          <a:lstStyle/>
-          <a:p>
-            <a:r>
-              <a:rPr lang="en-US" dirty="0"/>
-              <a:t>The SDLC helps us organize the process of building software</a:t>
-            </a:r>
-          </a:p>
-          <a:p>
-            <a:r>
-              <a:rPr lang="en-US" dirty="0"/>
-              <a:t>Includes steps for building, revising, and deploying software</a:t>
-            </a:r>
-          </a:p>
-          <a:p>
-            <a:r>
-              <a:rPr lang="en-US" dirty="0"/>
-              <a:t>Includes roles associated with each step along the building process</a:t>
-            </a:r>
-          </a:p>
-        </p:txBody>
-      </p:sp>
-    </p:spTree>
-    <p:extLst>
-      <p:ext uri="{BB962C8B-B14F-4D97-AF65-F5344CB8AC3E}">
-        <p14:creationId xmlns:p14="http://schemas.microsoft.com/office/powerpoint/2010/main" val="2158119916"/>
-      </p:ext>
-    </p:extLst>
-  </p:cSld>
-  <p:clrMapOvr>
-    <a:masterClrMapping/>
-  </p:clrMapOvr>
-</p:sld>
-</file>
-
-<file path=ppt/slides/slide7.xml><?xml version="1.0" encoding="utf-8"?>
-<p:sld xmlns:a="http://schemas.openxmlformats.org/drawingml/2006/main" xmlns:r="http://schemas.openxmlformats.org/officeDocument/2006/relationships" xmlns:p="http://schemas.openxmlformats.org/presentationml/2006/main">
-  <p:cSld>
-    <p:spTree>
-      <p:nvGrpSpPr>
-        <p:cNvPr id="1" name=""/>
-        <p:cNvGrpSpPr/>
-        <p:nvPr/>
-      </p:nvGrpSpPr>
-      <p:grpSpPr>
-        <a:xfrm>
-          <a:off x="0" y="0"/>
-          <a:ext cx="0" cy="0"/>
-          <a:chOff x="0" y="0"/>
-          <a:chExt cx="0" cy="0"/>
-        </a:xfrm>
-      </p:grpSpPr>
-      <p:pic>
-        <p:nvPicPr>
-          <p:cNvPr id="5" name="Picture 4" descr="Diagram&#10;&#10;Description automatically generated">
-            <a:extLst>
-              <a:ext uri="{FF2B5EF4-FFF2-40B4-BE49-F238E27FC236}">
-                <a16:creationId xmlns:a16="http://schemas.microsoft.com/office/drawing/2014/main" id="{F3984BEE-FE8D-EB37-FE61-BB680A777FD7}"/>
-              </a:ext>
-            </a:extLst>
-          </p:cNvPr>
-          <p:cNvPicPr>
-            <a:picLocks noChangeAspect="1"/>
-          </p:cNvPicPr>
-          <p:nvPr/>
-        </p:nvPicPr>
-        <p:blipFill rotWithShape="1">
-          <a:blip r:embed="rId3"/>
-          <a:srcRect l="8206" r="5127" b="-1"/>
-          <a:stretch/>
-        </p:blipFill>
-        <p:spPr>
-          <a:xfrm>
-            <a:off x="20" y="10"/>
-            <a:ext cx="12191980" cy="6857990"/>
-          </a:xfrm>
-          <a:prstGeom prst="rect">
-            <a:avLst/>
-          </a:prstGeom>
-        </p:spPr>
-      </p:pic>
-    </p:spTree>
-    <p:extLst>
-      <p:ext uri="{BB962C8B-B14F-4D97-AF65-F5344CB8AC3E}">
-        <p14:creationId xmlns:p14="http://schemas.microsoft.com/office/powerpoint/2010/main" val="3028504148"/>
-      </p:ext>
-    </p:extLst>
-  </p:cSld>
-  <p:clrMapOvr>
-    <a:masterClrMapping/>
-  </p:clrMapOvr>
-</p:sld>
-</file>
-
-<file path=ppt/slides/slide8.xml><?xml version="1.0" encoding="utf-8"?>
 <p:sld xmlns:a="http://schemas.openxmlformats.org/drawingml/2006/main" xmlns:r="http://schemas.openxmlformats.org/officeDocument/2006/relationships" xmlns:p="http://schemas.openxmlformats.org/presentationml/2006/main">
   <p:cSld>
     <p:bg>
@@ -20427,7 +19659,7 @@
 </p:sld>
 </file>
 
-<file path=ppt/slides/slide9.xml><?xml version="1.0" encoding="utf-8"?>
+<file path=ppt/slides/slide6.xml><?xml version="1.0" encoding="utf-8"?>
 <p:sld xmlns:a="http://schemas.openxmlformats.org/drawingml/2006/main" xmlns:r="http://schemas.openxmlformats.org/officeDocument/2006/relationships" xmlns:p="http://schemas.openxmlformats.org/presentationml/2006/main">
   <p:cSld>
     <p:bg>
@@ -20537,6 +19769,352 @@
     <p:extLst>
       <p:ext uri="{BB962C8B-B14F-4D97-AF65-F5344CB8AC3E}">
         <p14:creationId xmlns:p14="http://schemas.microsoft.com/office/powerpoint/2010/main" val="370590328"/>
+      </p:ext>
+    </p:extLst>
+  </p:cSld>
+  <p:clrMapOvr>
+    <a:masterClrMapping/>
+  </p:clrMapOvr>
+</p:sld>
+</file>
+
+<file path=ppt/slides/slide7.xml><?xml version="1.0" encoding="utf-8"?>
+<p:sld xmlns:a="http://schemas.openxmlformats.org/drawingml/2006/main" xmlns:r="http://schemas.openxmlformats.org/officeDocument/2006/relationships" xmlns:p="http://schemas.openxmlformats.org/presentationml/2006/main">
+  <p:cSld>
+    <p:bg>
+      <p:bgPr>
+        <a:solidFill>
+          <a:schemeClr val="bg1">
+            <a:lumMod val="95000"/>
+          </a:schemeClr>
+        </a:solidFill>
+        <a:effectLst/>
+      </p:bgPr>
+    </p:bg>
+    <p:spTree>
+      <p:nvGrpSpPr>
+        <p:cNvPr id="1" name=""/>
+        <p:cNvGrpSpPr/>
+        <p:nvPr/>
+      </p:nvGrpSpPr>
+      <p:grpSpPr>
+        <a:xfrm>
+          <a:off x="0" y="0"/>
+          <a:ext cx="0" cy="0"/>
+          <a:chOff x="0" y="0"/>
+          <a:chExt cx="0" cy="0"/>
+        </a:xfrm>
+      </p:grpSpPr>
+      <p:pic>
+        <p:nvPicPr>
+          <p:cNvPr id="6" name="Picture 3" descr="Background pattern&#10;&#10;Description automatically generated">
+            <a:extLst>
+              <a:ext uri="{FF2B5EF4-FFF2-40B4-BE49-F238E27FC236}">
+                <a16:creationId xmlns:a16="http://schemas.microsoft.com/office/drawing/2014/main" id="{D32171E9-270F-BA0C-17D9-9525FB89BC77}"/>
+              </a:ext>
+            </a:extLst>
+          </p:cNvPr>
+          <p:cNvPicPr>
+            <a:picLocks noChangeAspect="1"/>
+          </p:cNvPicPr>
+          <p:nvPr/>
+        </p:nvPicPr>
+        <p:blipFill rotWithShape="1">
+          <a:blip r:embed="rId2"/>
+          <a:srcRect t="3334" b="12397"/>
+          <a:stretch/>
+        </p:blipFill>
+        <p:spPr>
+          <a:xfrm>
+            <a:off x="20" y="10"/>
+            <a:ext cx="12191980" cy="6857990"/>
+          </a:xfrm>
+          <a:prstGeom prst="rect">
+            <a:avLst/>
+          </a:prstGeom>
+        </p:spPr>
+      </p:pic>
+      <p:sp>
+        <p:nvSpPr>
+          <p:cNvPr id="2" name="Title 1">
+            <a:extLst>
+              <a:ext uri="{FF2B5EF4-FFF2-40B4-BE49-F238E27FC236}">
+                <a16:creationId xmlns:a16="http://schemas.microsoft.com/office/drawing/2014/main" id="{B963730F-E840-E5E0-87C0-65F532F962AC}"/>
+              </a:ext>
+            </a:extLst>
+          </p:cNvPr>
+          <p:cNvSpPr>
+            <a:spLocks noGrp="1"/>
+          </p:cNvSpPr>
+          <p:nvPr>
+            <p:ph type="title"/>
+          </p:nvPr>
+        </p:nvSpPr>
+        <p:spPr>
+          <a:xfrm>
+            <a:off x="1601724" y="2606040"/>
+            <a:ext cx="8988552" cy="1645920"/>
+          </a:xfrm>
+          <a:solidFill>
+            <a:srgbClr val="000000">
+              <a:alpha val="70000"/>
+            </a:srgbClr>
+          </a:solidFill>
+          <a:ln>
+            <a:solidFill>
+              <a:srgbClr val="FFFFFF"/>
+            </a:solidFill>
+          </a:ln>
+        </p:spPr>
+        <p:txBody>
+          <a:bodyPr>
+            <a:normAutofit/>
+          </a:bodyPr>
+          <a:lstStyle/>
+          <a:p>
+            <a:r>
+              <a:rPr lang="en-US" sz="3800">
+                <a:solidFill>
+                  <a:srgbClr val="FFFFFF"/>
+                </a:solidFill>
+              </a:rPr>
+              <a:t>Preview day 3</a:t>
+            </a:r>
+          </a:p>
+        </p:txBody>
+      </p:sp>
+    </p:spTree>
+    <p:extLst>
+      <p:ext uri="{BB962C8B-B14F-4D97-AF65-F5344CB8AC3E}">
+        <p14:creationId xmlns:p14="http://schemas.microsoft.com/office/powerpoint/2010/main" val="3104054636"/>
+      </p:ext>
+    </p:extLst>
+  </p:cSld>
+  <p:clrMapOvr>
+    <a:masterClrMapping/>
+  </p:clrMapOvr>
+</p:sld>
+</file>
+
+<file path=ppt/slides/slide8.xml><?xml version="1.0" encoding="utf-8"?>
+<p:sld xmlns:a="http://schemas.openxmlformats.org/drawingml/2006/main" xmlns:r="http://schemas.openxmlformats.org/officeDocument/2006/relationships" xmlns:p="http://schemas.openxmlformats.org/presentationml/2006/main">
+  <p:cSld>
+    <p:bg>
+      <p:bgPr>
+        <a:blipFill>
+          <a:blip r:embed="rId2"/>
+          <a:stretch/>
+        </a:blipFill>
+        <a:effectLst/>
+      </p:bgPr>
+    </p:bg>
+    <p:spTree>
+      <p:nvGrpSpPr>
+        <p:cNvPr id="1" name=""/>
+        <p:cNvGrpSpPr/>
+        <p:nvPr/>
+      </p:nvGrpSpPr>
+      <p:grpSpPr>
+        <a:xfrm>
+          <a:off x="0" y="0"/>
+          <a:ext cx="0" cy="0"/>
+          <a:chOff x="0" y="0"/>
+          <a:chExt cx="0" cy="0"/>
+        </a:xfrm>
+      </p:grpSpPr>
+      <p:pic>
+        <p:nvPicPr>
+          <p:cNvPr id="23" name="Picture 6">
+            <a:extLst>
+              <a:ext uri="{FF2B5EF4-FFF2-40B4-BE49-F238E27FC236}">
+                <a16:creationId xmlns:a16="http://schemas.microsoft.com/office/drawing/2014/main" id="{18BD78ED-75E1-4879-B369-BC61F7C45E22}"/>
+              </a:ext>
+              <a:ext uri="{C183D7F6-B498-43B3-948B-1728B52AA6E4}">
+                <adec:decorative xmlns:adec="http://schemas.microsoft.com/office/drawing/2017/decorative" val="1"/>
+              </a:ext>
+            </a:extLst>
+          </p:cNvPr>
+          <p:cNvPicPr>
+            <a:picLocks noGrp="1" noRot="1" noChangeAspect="1" noMove="1" noResize="1" noEditPoints="1" noAdjustHandles="1" noChangeArrowheads="1" noChangeShapeType="1" noCrop="1"/>
+          </p:cNvPicPr>
+          <p:nvPr>
+            <p:extLst>
+              <p:ext uri="{386F3935-93C4-4BCD-93E2-E3B085C9AB24}">
+                <p16:designElem xmlns:p16="http://schemas.microsoft.com/office/powerpoint/2015/main" val="1"/>
+              </p:ext>
+            </p:extLst>
+          </p:nvPr>
+        </p:nvPicPr>
+        <p:blipFill>
+          <a:blip r:embed="rId3">
+            <a:extLst>
+              <a:ext uri="{28A0092B-C50C-407E-A947-70E740481C1C}">
+                <a14:useLocalDpi xmlns:a14="http://schemas.microsoft.com/office/drawing/2010/main" val="0"/>
+              </a:ext>
+            </a:extLst>
+          </a:blip>
+          <a:stretch>
+            <a:fillRect/>
+          </a:stretch>
+        </p:blipFill>
+        <p:spPr>
+          <a:xfrm>
+            <a:off x="0" y="0"/>
+            <a:ext cx="12188825" cy="6856214"/>
+          </a:xfrm>
+          <a:prstGeom prst="rect">
+            <a:avLst/>
+          </a:prstGeom>
+        </p:spPr>
+      </p:pic>
+      <p:sp useBgFill="1">
+        <p:nvSpPr>
+          <p:cNvPr id="24" name="Rectangle 8">
+            <a:extLst>
+              <a:ext uri="{FF2B5EF4-FFF2-40B4-BE49-F238E27FC236}">
+                <a16:creationId xmlns:a16="http://schemas.microsoft.com/office/drawing/2014/main" id="{3D1E5586-8BB5-40F6-96C3-2E87DD7CE5CD}"/>
+              </a:ext>
+              <a:ext uri="{C183D7F6-B498-43B3-948B-1728B52AA6E4}">
+                <adec:decorative xmlns:adec="http://schemas.microsoft.com/office/drawing/2017/decorative" val="1"/>
+              </a:ext>
+            </a:extLst>
+          </p:cNvPr>
+          <p:cNvSpPr>
+            <a:spLocks noGrp="1" noRot="1" noChangeAspect="1" noMove="1" noResize="1" noEditPoints="1" noAdjustHandles="1" noChangeArrowheads="1" noChangeShapeType="1" noTextEdit="1"/>
+          </p:cNvSpPr>
+          <p:nvPr>
+            <p:extLst>
+              <p:ext uri="{386F3935-93C4-4BCD-93E2-E3B085C9AB24}">
+                <p16:designElem xmlns:p16="http://schemas.microsoft.com/office/powerpoint/2015/main" val="1"/>
+              </p:ext>
+            </p:extLst>
+          </p:nvPr>
+        </p:nvSpPr>
+        <p:spPr>
+          <a:xfrm>
+            <a:off x="0" y="0"/>
+            <a:ext cx="12192000" cy="6858000"/>
+          </a:xfrm>
+          <a:prstGeom prst="rect">
+            <a:avLst/>
+          </a:prstGeom>
+          <a:ln>
+            <a:noFill/>
+          </a:ln>
+        </p:spPr>
+        <p:style>
+          <a:lnRef idx="2">
+            <a:schemeClr val="accent1">
+              <a:shade val="50000"/>
+            </a:schemeClr>
+          </a:lnRef>
+          <a:fillRef idx="1">
+            <a:schemeClr val="accent1"/>
+          </a:fillRef>
+          <a:effectRef idx="0">
+            <a:schemeClr val="accent1"/>
+          </a:effectRef>
+          <a:fontRef idx="minor">
+            <a:schemeClr val="lt1"/>
+          </a:fontRef>
+        </p:style>
+        <p:txBody>
+          <a:bodyPr rtlCol="0" anchor="ctr"/>
+          <a:lstStyle/>
+          <a:p>
+            <a:pPr algn="ctr"/>
+            <a:endParaRPr lang="en-US"/>
+          </a:p>
+        </p:txBody>
+      </p:sp>
+      <p:sp>
+        <p:nvSpPr>
+          <p:cNvPr id="2" name="Title 1">
+            <a:extLst>
+              <a:ext uri="{FF2B5EF4-FFF2-40B4-BE49-F238E27FC236}">
+                <a16:creationId xmlns:a16="http://schemas.microsoft.com/office/drawing/2014/main" id="{7C70C265-2288-E1A8-09A1-9D59E121A171}"/>
+              </a:ext>
+            </a:extLst>
+          </p:cNvPr>
+          <p:cNvSpPr>
+            <a:spLocks noGrp="1"/>
+          </p:cNvSpPr>
+          <p:nvPr>
+            <p:ph type="title"/>
+          </p:nvPr>
+        </p:nvSpPr>
+        <p:spPr>
+          <a:xfrm>
+            <a:off x="1993805" y="1354668"/>
+            <a:ext cx="8204391" cy="2346475"/>
+          </a:xfrm>
+        </p:spPr>
+        <p:txBody>
+          <a:bodyPr vert="horz" lIns="91440" tIns="45720" rIns="91440" bIns="45720" rtlCol="0" anchor="b">
+            <a:normAutofit/>
+          </a:bodyPr>
+          <a:lstStyle/>
+          <a:p>
+            <a:pPr algn="ctr"/>
+            <a:r>
+              <a:rPr lang="en-US" sz="6000"/>
+              <a:t>See you next time!</a:t>
+            </a:r>
+          </a:p>
+        </p:txBody>
+      </p:sp>
+      <p:cxnSp>
+        <p:nvCxnSpPr>
+          <p:cNvPr id="25" name="Straight Connector 10">
+            <a:extLst>
+              <a:ext uri="{FF2B5EF4-FFF2-40B4-BE49-F238E27FC236}">
+                <a16:creationId xmlns:a16="http://schemas.microsoft.com/office/drawing/2014/main" id="{8A832D40-B9E2-4CE7-9E0A-B35591EA2035}"/>
+              </a:ext>
+              <a:ext uri="{C183D7F6-B498-43B3-948B-1728B52AA6E4}">
+                <adec:decorative xmlns:adec="http://schemas.microsoft.com/office/drawing/2017/decorative" val="1"/>
+              </a:ext>
+            </a:extLst>
+          </p:cNvPr>
+          <p:cNvCxnSpPr>
+            <a:cxnSpLocks noGrp="1" noRot="1" noChangeAspect="1" noMove="1" noResize="1" noEditPoints="1" noAdjustHandles="1" noChangeArrowheads="1" noChangeShapeType="1"/>
+          </p:cNvCxnSpPr>
+          <p:nvPr>
+            <p:extLst>
+              <p:ext uri="{386F3935-93C4-4BCD-93E2-E3B085C9AB24}">
+                <p16:designElem xmlns:p16="http://schemas.microsoft.com/office/powerpoint/2015/main" val="1"/>
+              </p:ext>
+            </p:extLst>
+          </p:nvPr>
+        </p:nvCxnSpPr>
+        <p:spPr>
+          <a:xfrm>
+            <a:off x="5845629" y="3810000"/>
+            <a:ext cx="500743" cy="0"/>
+          </a:xfrm>
+          <a:prstGeom prst="line">
+            <a:avLst/>
+          </a:prstGeom>
+          <a:ln w="19050"/>
+        </p:spPr>
+        <p:style>
+          <a:lnRef idx="1">
+            <a:schemeClr val="accent1"/>
+          </a:lnRef>
+          <a:fillRef idx="0">
+            <a:schemeClr val="accent1"/>
+          </a:fillRef>
+          <a:effectRef idx="0">
+            <a:schemeClr val="accent1"/>
+          </a:effectRef>
+          <a:fontRef idx="minor">
+            <a:schemeClr val="tx1"/>
+          </a:fontRef>
+        </p:style>
+      </p:cxnSp>
+    </p:spTree>
+    <p:extLst>
+      <p:ext uri="{BB962C8B-B14F-4D97-AF65-F5344CB8AC3E}">
+        <p14:creationId xmlns:p14="http://schemas.microsoft.com/office/powerpoint/2010/main" val="3451560091"/>
       </p:ext>
     </p:extLst>
   </p:cSld>

</xml_diff>